<commit_message>
Se mejoró la redacción de algunos items. Siguen faltando los gráficos y estadísticas.
</commit_message>
<xml_diff>
--- a/Proyecto final/SprintsDevelopment/Branch 02/DocumentosAEntregar/Sprint 02.pptx
+++ b/Proyecto final/SprintsDevelopment/Branch 02/DocumentosAEntregar/Sprint 02.pptx
@@ -3943,39 +3943,8 @@
                 <a:ea typeface="+mj-ea"/>
                 <a:cs typeface="+mj-cs"/>
               </a:rPr>
-              <a:t>Sprint </a:t>
-            </a:r>
-            <a:r>
-              <a:rPr kumimoji="0" lang="es-AR" sz="4400" b="0" i="0" u="none" strike="noStrike" kern="1200" cap="none" spc="0" normalizeH="0" baseline="0" noProof="0" dirty="0" err="1" smtClean="0">
-                <a:ln>
-                  <a:noFill/>
-                </a:ln>
-                <a:solidFill>
-                  <a:schemeClr val="tx1"/>
-                </a:solidFill>
-                <a:effectLst/>
-                <a:uLnTx/>
-                <a:uFillTx/>
-                <a:latin typeface="+mj-lt"/>
-                <a:ea typeface="+mj-ea"/>
-                <a:cs typeface="+mj-cs"/>
-              </a:rPr>
-              <a:t>Review</a:t>
-            </a:r>
-            <a:endParaRPr kumimoji="0" lang="es-AR" sz="4400" b="0" i="0" u="none" strike="noStrike" kern="1200" cap="none" spc="0" normalizeH="0" baseline="0" noProof="0" dirty="0" smtClean="0">
-              <a:ln>
-                <a:noFill/>
-              </a:ln>
-              <a:solidFill>
-                <a:schemeClr val="tx1"/>
-              </a:solidFill>
-              <a:effectLst/>
-              <a:uLnTx/>
-              <a:uFillTx/>
-              <a:latin typeface="+mj-lt"/>
-              <a:ea typeface="+mj-ea"/>
-              <a:cs typeface="+mj-cs"/>
-            </a:endParaRPr>
+              <a:t>Sprint Review</a:t>
+            </a:r>
           </a:p>
         </p:txBody>
       </p:sp>
@@ -4017,13 +3986,13 @@
         <p:spPr/>
         <p:txBody>
           <a:bodyPr>
-            <a:normAutofit fontScale="90000"/>
+            <a:normAutofit/>
           </a:bodyPr>
           <a:lstStyle/>
           <a:p>
             <a:r>
               <a:rPr lang="es-AR" dirty="0" smtClean="0"/>
-              <a:t>Que podemos hacer para mejorar</a:t>
+              <a:t>Mejoras pendientes</a:t>
             </a:r>
             <a:endParaRPr lang="es-AR" dirty="0"/>
           </a:p>
@@ -4048,19 +4017,27 @@
           <a:p>
             <a:r>
               <a:rPr lang="es-AR" dirty="0" smtClean="0"/>
-              <a:t>Como equipo debemos mejorar el desarrollo comunicacional con el </a:t>
+              <a:t>Mayor comunicación </a:t>
+            </a:r>
+            <a:r>
+              <a:rPr lang="es-AR" dirty="0" smtClean="0"/>
+              <a:t>con el </a:t>
             </a:r>
             <a:r>
               <a:rPr lang="es-AR" dirty="0" err="1" smtClean="0"/>
-              <a:t>product</a:t>
+              <a:t>Product</a:t>
             </a:r>
             <a:r>
               <a:rPr lang="es-AR" dirty="0" smtClean="0"/>
               <a:t> </a:t>
             </a:r>
             <a:r>
+              <a:rPr lang="es-AR" dirty="0" err="1"/>
+              <a:t>O</a:t>
+            </a:r>
+            <a:r>
               <a:rPr lang="es-AR" dirty="0" err="1" smtClean="0"/>
-              <a:t>owner</a:t>
+              <a:t>wner</a:t>
             </a:r>
             <a:r>
               <a:rPr lang="es-AR" dirty="0" smtClean="0"/>
@@ -4068,20 +4045,23 @@
             </a:r>
           </a:p>
           <a:p>
+            <a:pPr marL="0" indent="0">
+              <a:buNone/>
+            </a:pPr>
             <a:endParaRPr lang="es-AR" dirty="0" smtClean="0"/>
           </a:p>
           <a:p>
             <a:r>
               <a:rPr lang="es-AR" dirty="0" smtClean="0"/>
-              <a:t>Debemos seguir readaptando constantemente y sin demora </a:t>
+              <a:t>Mayor flexibilidad a la hora de </a:t>
             </a:r>
             <a:r>
               <a:rPr lang="es-AR" dirty="0" err="1" smtClean="0"/>
-              <a:t>replanificaciones</a:t>
-            </a:r>
-            <a:r>
-              <a:rPr lang="es-AR" dirty="0" smtClean="0"/>
-              <a:t> y asignaciones de </a:t>
+              <a:t>replanificar</a:t>
+            </a:r>
+            <a:r>
+              <a:rPr lang="es-AR" dirty="0" smtClean="0"/>
+              <a:t>  y reasignar </a:t>
             </a:r>
             <a:r>
               <a:rPr lang="es-AR" dirty="0" err="1" smtClean="0"/>
@@ -4106,7 +4086,11 @@
           <a:p>
             <a:r>
               <a:rPr lang="es-AR" dirty="0" smtClean="0"/>
-              <a:t>Debemos comenzar con un proceso inicial de integración del producto.</a:t>
+              <a:t>Comenzar </a:t>
+            </a:r>
+            <a:r>
+              <a:rPr lang="es-AR" dirty="0" smtClean="0"/>
+              <a:t>con un proceso inicial de integración del producto.</a:t>
             </a:r>
             <a:endParaRPr lang="es-AR" dirty="0"/>
           </a:p>
@@ -4429,48 +4413,59 @@
           <a:p>
             <a:r>
               <a:rPr lang="es-AR" dirty="0" smtClean="0"/>
-              <a:t>Objetivos del Sprint 02</a:t>
-            </a:r>
-          </a:p>
-          <a:p>
-            <a:r>
-              <a:rPr lang="es-AR" dirty="0" smtClean="0"/>
-              <a:t>Logros.</a:t>
-            </a:r>
-          </a:p>
-          <a:p>
-            <a:r>
-              <a:rPr lang="es-AR" dirty="0" smtClean="0"/>
-              <a:t>Inconvenientes.</a:t>
-            </a:r>
-          </a:p>
-          <a:p>
-            <a:r>
-              <a:rPr lang="es-AR" dirty="0" err="1" smtClean="0"/>
-              <a:t>Tasks</a:t>
-            </a:r>
-            <a:r>
-              <a:rPr lang="es-AR" dirty="0" smtClean="0"/>
-              <a:t> postergadas al siguiente sprint.</a:t>
-            </a:r>
-          </a:p>
-          <a:p>
-            <a:r>
-              <a:rPr lang="es-AR" dirty="0" smtClean="0"/>
-              <a:t>Que podemos hacer para mejorar.</a:t>
-            </a:r>
-          </a:p>
-          <a:p>
-            <a:r>
-              <a:rPr lang="es-AR" dirty="0" smtClean="0"/>
-              <a:t>Gráficos y estadísticas de proyecto.</a:t>
-            </a:r>
-          </a:p>
-          <a:p>
-            <a:r>
-              <a:rPr lang="es-AR" dirty="0" smtClean="0"/>
-              <a:t>Resumen de desarrollo.</a:t>
-            </a:r>
+              <a:t>Objetivos</a:t>
+            </a:r>
+            <a:endParaRPr lang="es-AR" dirty="0" smtClean="0"/>
+          </a:p>
+          <a:p>
+            <a:r>
+              <a:rPr lang="es-AR" dirty="0" smtClean="0"/>
+              <a:t>Logros</a:t>
+            </a:r>
+            <a:endParaRPr lang="es-AR" dirty="0" smtClean="0"/>
+          </a:p>
+          <a:p>
+            <a:r>
+              <a:rPr lang="es-AR" dirty="0" smtClean="0"/>
+              <a:t>Inconvenientes</a:t>
+            </a:r>
+            <a:endParaRPr lang="es-AR" dirty="0" smtClean="0"/>
+          </a:p>
+          <a:p>
+            <a:r>
+              <a:rPr lang="es-AR" dirty="0" smtClean="0"/>
+              <a:t>Tareas postergadas</a:t>
+            </a:r>
+            <a:endParaRPr lang="es-AR" dirty="0" smtClean="0"/>
+          </a:p>
+          <a:p>
+            <a:r>
+              <a:rPr lang="es-AR" dirty="0" smtClean="0"/>
+              <a:t>Mejoras pendientes</a:t>
+            </a:r>
+            <a:endParaRPr lang="es-AR" dirty="0" smtClean="0"/>
+          </a:p>
+          <a:p>
+            <a:r>
+              <a:rPr lang="es-AR" dirty="0" smtClean="0"/>
+              <a:t>Gráficos y estadísticas de </a:t>
+            </a:r>
+            <a:r>
+              <a:rPr lang="es-AR" dirty="0" smtClean="0"/>
+              <a:t>proyecto</a:t>
+            </a:r>
+            <a:endParaRPr lang="es-AR" dirty="0" smtClean="0"/>
+          </a:p>
+          <a:p>
+            <a:r>
+              <a:rPr lang="es-AR" dirty="0" smtClean="0"/>
+              <a:t>Resumen de </a:t>
+            </a:r>
+            <a:r>
+              <a:rPr lang="es-AR" dirty="0" smtClean="0"/>
+              <a:t>desarrollo</a:t>
+            </a:r>
+            <a:endParaRPr lang="es-AR" dirty="0" smtClean="0"/>
           </a:p>
           <a:p>
             <a:endParaRPr lang="es-AR" dirty="0"/>
@@ -4593,8 +4588,13 @@
           <a:p>
             <a:r>
               <a:rPr lang="es-AR" dirty="0" smtClean="0"/>
-              <a:t>Planificar, dirigir y controlar el Sprint de forma que no ocurran errores e inconvenientes como en el Sprint 01.</a:t>
-            </a:r>
+              <a:t>Planificar, dirigir y controlar el Sprint de forma </a:t>
+            </a:r>
+            <a:r>
+              <a:rPr lang="es-AR" dirty="0" smtClean="0"/>
+              <a:t>correcta, para evitar inconvenientes.</a:t>
+            </a:r>
+            <a:endParaRPr lang="es-AR" dirty="0" smtClean="0"/>
           </a:p>
           <a:p>
             <a:endParaRPr lang="es-AR" dirty="0"/>
@@ -4602,8 +4602,21 @@
           <a:p>
             <a:r>
               <a:rPr lang="es-AR" dirty="0" smtClean="0"/>
-              <a:t>Completar el modelo de clases de diseño del producto y el modelo de BD.</a:t>
-            </a:r>
+              <a:t>Completar el modelo de clases </a:t>
+            </a:r>
+            <a:r>
+              <a:rPr lang="es-AR" dirty="0" smtClean="0"/>
+              <a:t>del </a:t>
+            </a:r>
+            <a:r>
+              <a:rPr lang="es-AR" dirty="0" smtClean="0"/>
+              <a:t>producto y el modelo de </a:t>
+            </a:r>
+            <a:r>
+              <a:rPr lang="es-AR" dirty="0" smtClean="0"/>
+              <a:t>Base de Datos.</a:t>
+            </a:r>
+            <a:endParaRPr lang="es-AR" dirty="0" smtClean="0"/>
           </a:p>
           <a:p>
             <a:endParaRPr lang="es-AR" dirty="0"/>
@@ -4611,7 +4624,11 @@
           <a:p>
             <a:r>
               <a:rPr lang="es-AR" dirty="0" smtClean="0"/>
-              <a:t>Concretar con los últimos test de desarrollo para iniciar la producción concreta del producto.</a:t>
+              <a:t>Llevar a cabo los </a:t>
+            </a:r>
+            <a:r>
+              <a:rPr lang="es-AR" dirty="0" smtClean="0"/>
+              <a:t>últimos test de desarrollo para iniciar la producción concreta del producto.</a:t>
             </a:r>
           </a:p>
           <a:p>
@@ -4921,13 +4938,29 @@
         <p:spPr/>
         <p:txBody>
           <a:bodyPr>
-            <a:normAutofit fontScale="62500" lnSpcReduction="20000"/>
+            <a:normAutofit fontScale="70000" lnSpcReduction="20000"/>
           </a:bodyPr>
           <a:lstStyle/>
           <a:p>
             <a:r>
               <a:rPr lang="es-AR" dirty="0" smtClean="0"/>
-              <a:t>El nuevo integrante pudo desarrollar su nueva integración al proyecto de una forma correcta.</a:t>
+              <a:t>El nuevo </a:t>
+            </a:r>
+            <a:r>
+              <a:rPr lang="es-AR" dirty="0" smtClean="0"/>
+              <a:t>integrante pudo incorporase  al </a:t>
+            </a:r>
+            <a:r>
+              <a:rPr lang="es-AR" dirty="0" smtClean="0"/>
+              <a:t>proyecto de </a:t>
+            </a:r>
+            <a:r>
+              <a:rPr lang="es-AR" dirty="0" smtClean="0"/>
+              <a:t>forma </a:t>
+            </a:r>
+            <a:r>
+              <a:rPr lang="es-AR" dirty="0" smtClean="0"/>
+              <a:t>correcta.</a:t>
             </a:r>
             <a:endParaRPr lang="es-AR" dirty="0"/>
           </a:p>
@@ -4937,7 +4970,23 @@
           <a:p>
             <a:r>
               <a:rPr lang="es-AR" dirty="0" smtClean="0"/>
-              <a:t>Fueron definidos nuevos roles para el integrante, de ahora en más se incorpora un nuevo Ingeniero de Software (con orientación a desarrollo web) y DBA para el desarrollo del producto.</a:t>
+              <a:t>Fueron definidos </a:t>
+            </a:r>
+            <a:r>
+              <a:rPr lang="es-AR" dirty="0" smtClean="0"/>
+              <a:t>los roles </a:t>
+            </a:r>
+            <a:r>
+              <a:rPr lang="es-AR" dirty="0" smtClean="0"/>
+              <a:t>para el </a:t>
+            </a:r>
+            <a:r>
+              <a:rPr lang="es-AR" dirty="0" smtClean="0"/>
+              <a:t>integrante;  </a:t>
+            </a:r>
+            <a:r>
+              <a:rPr lang="es-AR" dirty="0" smtClean="0"/>
+              <a:t>un nuevo Ingeniero de Software (con orientación a desarrollo web) y DBA para el desarrollo del producto.</a:t>
             </a:r>
           </a:p>
           <a:p>
@@ -5398,8 +5447,21 @@
           <a:p>
             <a:r>
               <a:rPr lang="es-AR" dirty="0" smtClean="0"/>
-              <a:t>Se plantearon inconvenientes en cuanto a la adaptación de la arquitectura para cumplimentar el desarrollo entre lenguajes, por suerte el inconveniente fue resuelto.</a:t>
-            </a:r>
+              <a:t>Se plantearon inconvenientes en </a:t>
+            </a:r>
+            <a:r>
+              <a:rPr lang="es-AR" dirty="0" smtClean="0"/>
+              <a:t>la </a:t>
+            </a:r>
+            <a:r>
+              <a:rPr lang="es-AR" dirty="0" smtClean="0"/>
+              <a:t>adaptación de la arquitectura para cumplimentar el desarrollo entre </a:t>
+            </a:r>
+            <a:r>
+              <a:rPr lang="es-AR" dirty="0" smtClean="0"/>
+              <a:t>lenguajes.</a:t>
+            </a:r>
+            <a:endParaRPr lang="es-AR" dirty="0" smtClean="0"/>
           </a:p>
           <a:p>
             <a:endParaRPr lang="es-AR" dirty="0"/>
@@ -5425,7 +5487,11 @@
           <a:p>
             <a:r>
               <a:rPr lang="es-AR" dirty="0" smtClean="0"/>
-              <a:t>Se dejó una </a:t>
+              <a:t>Se </a:t>
+            </a:r>
+            <a:r>
+              <a:rPr lang="es-AR" dirty="0" smtClean="0"/>
+              <a:t>postergó una </a:t>
             </a:r>
             <a:r>
               <a:rPr lang="es-AR" dirty="0" err="1" smtClean="0"/>
@@ -5441,7 +5507,15 @@
             </a:r>
             <a:r>
               <a:rPr lang="es-AR" dirty="0" smtClean="0"/>
-              <a:t> para un siguiente sprint, porque era necesario mejorar algunos aspectos técnicos.</a:t>
+              <a:t> para un siguiente sprint, </a:t>
+            </a:r>
+            <a:r>
+              <a:rPr lang="es-AR" dirty="0" smtClean="0"/>
+              <a:t>ya que era </a:t>
+            </a:r>
+            <a:r>
+              <a:rPr lang="es-AR" dirty="0" smtClean="0"/>
+              <a:t>necesario mejorar algunos aspectos técnicos.</a:t>
             </a:r>
             <a:endParaRPr lang="es-AR" dirty="0"/>
           </a:p>
@@ -5915,12 +5989,20 @@
           <a:lstStyle/>
           <a:p>
             <a:r>
-              <a:rPr lang="es-AR" sz="3600" dirty="0" err="1" smtClean="0"/>
-              <a:t>Tasks</a:t>
-            </a:r>
-            <a:r>
               <a:rPr lang="es-AR" sz="3600" dirty="0" smtClean="0"/>
-              <a:t> postergadas para el Siguiente Sprint</a:t>
+              <a:t>Tareas postergadas </a:t>
+            </a:r>
+            <a:r>
+              <a:rPr lang="es-AR" sz="3600" dirty="0" smtClean="0"/>
+              <a:t>para el </a:t>
+            </a:r>
+            <a:r>
+              <a:rPr lang="es-AR" sz="3600" dirty="0" smtClean="0"/>
+              <a:t>siguiente </a:t>
+            </a:r>
+            <a:r>
+              <a:rPr lang="es-AR" sz="3600" dirty="0" smtClean="0"/>
+              <a:t>Sprint</a:t>
             </a:r>
             <a:endParaRPr lang="es-AR" sz="3600" dirty="0"/>
           </a:p>
@@ -5943,19 +6025,7 @@
           <a:p>
             <a:r>
               <a:rPr lang="es-AR" dirty="0" smtClean="0"/>
-              <a:t>Realizar pruebas de recuperación de </a:t>
-            </a:r>
-            <a:r>
-              <a:rPr lang="es-AR" dirty="0" smtClean="0"/>
-              <a:t>imágenes </a:t>
-            </a:r>
-            <a:r>
-              <a:rPr lang="es-AR" dirty="0" smtClean="0"/>
-              <a:t>comprimidas en la base de datos</a:t>
-            </a:r>
-            <a:r>
-              <a:rPr lang="es-AR" dirty="0" smtClean="0"/>
-              <a:t>.</a:t>
+              <a:t>Realizar pruebas de recuperación de imágenes comprimidas en la base de datos.</a:t>
             </a:r>
           </a:p>
           <a:p>
@@ -5964,7 +6034,19 @@
           <a:p>
             <a:r>
               <a:rPr lang="es-AR" dirty="0" smtClean="0"/>
-              <a:t>Implementar en el motor de base de datos funcionalidad para almacenar imágenes.</a:t>
+              <a:t>Implementar </a:t>
+            </a:r>
+            <a:r>
+              <a:rPr lang="es-AR" dirty="0" smtClean="0"/>
+              <a:t> funcionalidad para almacenar imágenes en </a:t>
+            </a:r>
+            <a:r>
+              <a:rPr lang="es-AR" dirty="0" smtClean="0"/>
+              <a:t>el motor de base de </a:t>
+            </a:r>
+            <a:r>
+              <a:rPr lang="es-AR" dirty="0" smtClean="0"/>
+              <a:t>datos.</a:t>
             </a:r>
             <a:endParaRPr lang="es-AR" dirty="0"/>
           </a:p>

</xml_diff>